<commit_message>
swapped slides 5 and 6 on the ppt
</commit_message>
<xml_diff>
--- a/Requirements/Comms Project.pptx
+++ b/Requirements/Comms Project.pptx
@@ -12,8 +12,8 @@
     <p:sldId id="257" r:id="rId3"/>
     <p:sldId id="258" r:id="rId4"/>
     <p:sldId id="259" r:id="rId5"/>
-    <p:sldId id="260" r:id="rId6"/>
-    <p:sldId id="261" r:id="rId7"/>
+    <p:sldId id="261" r:id="rId6"/>
+    <p:sldId id="260" r:id="rId7"/>
   </p:sldIdLst>
   <p:sldSz cx="9144000" cy="5143500" type="screen16x9"/>
   <p:notesSz cx="6858000" cy="9144000"/>
@@ -1143,6 +1143,110 @@
   <p:cSld>
     <p:spTree>
       <p:nvGrpSpPr>
+        <p:cNvPr id="1" name="Shape 159"/>
+        <p:cNvGrpSpPr/>
+        <p:nvPr/>
+      </p:nvGrpSpPr>
+      <p:grpSpPr>
+        <a:xfrm>
+          <a:off x="0" y="0"/>
+          <a:ext cx="0" cy="0"/>
+          <a:chOff x="0" y="0"/>
+          <a:chExt cx="0" cy="0"/>
+        </a:xfrm>
+      </p:grpSpPr>
+      <p:sp>
+        <p:nvSpPr>
+          <p:cNvPr id="160" name="Google Shape;160;g286ee612a7b_2_5:notes"/>
+          <p:cNvSpPr>
+            <a:spLocks noGrp="1" noRot="1" noChangeAspect="1"/>
+          </p:cNvSpPr>
+          <p:nvPr>
+            <p:ph type="sldImg" idx="2"/>
+          </p:nvPr>
+        </p:nvSpPr>
+        <p:spPr>
+          <a:xfrm>
+            <a:off x="381000" y="685800"/>
+            <a:ext cx="6096000" cy="3429000"/>
+          </a:xfrm>
+          <a:custGeom>
+            <a:avLst/>
+            <a:gdLst/>
+            <a:ahLst/>
+            <a:cxnLst/>
+            <a:rect l="l" t="t" r="r" b="b"/>
+            <a:pathLst>
+              <a:path w="120000" h="120000" extrusionOk="0">
+                <a:moveTo>
+                  <a:pt x="0" y="0"/>
+                </a:moveTo>
+                <a:lnTo>
+                  <a:pt x="120000" y="0"/>
+                </a:lnTo>
+                <a:lnTo>
+                  <a:pt x="120000" y="120000"/>
+                </a:lnTo>
+                <a:lnTo>
+                  <a:pt x="0" y="120000"/>
+                </a:lnTo>
+                <a:close/>
+              </a:path>
+            </a:pathLst>
+          </a:custGeom>
+        </p:spPr>
+      </p:sp>
+      <p:sp>
+        <p:nvSpPr>
+          <p:cNvPr id="161" name="Google Shape;161;g286ee612a7b_2_5:notes"/>
+          <p:cNvSpPr txBox="1">
+            <a:spLocks noGrp="1"/>
+          </p:cNvSpPr>
+          <p:nvPr>
+            <p:ph type="body" idx="1"/>
+          </p:nvPr>
+        </p:nvSpPr>
+        <p:spPr>
+          <a:xfrm>
+            <a:off x="685800" y="4343400"/>
+            <a:ext cx="5486400" cy="4114800"/>
+          </a:xfrm>
+          <a:prstGeom prst="rect">
+            <a:avLst/>
+          </a:prstGeom>
+        </p:spPr>
+        <p:txBody>
+          <a:bodyPr spcFirstLastPara="1" wrap="square" lIns="91425" tIns="91425" rIns="91425" bIns="91425" anchor="t" anchorCtr="0">
+            <a:noAutofit/>
+          </a:bodyPr>
+          <a:lstStyle/>
+          <a:p>
+            <a:pPr marL="0" lvl="0" indent="0" algn="l" rtl="0">
+              <a:spcBef>
+                <a:spcPts val="0"/>
+              </a:spcBef>
+              <a:spcAft>
+                <a:spcPts val="0"/>
+              </a:spcAft>
+              <a:buNone/>
+            </a:pPr>
+            <a:endParaRPr/>
+          </a:p>
+        </p:txBody>
+      </p:sp>
+    </p:spTree>
+  </p:cSld>
+  <p:clrMapOvr>
+    <a:masterClrMapping/>
+  </p:clrMapOvr>
+</p:notes>
+</file>
+
+<file path=ppt/notesSlides/notesSlide6.xml><?xml version="1.0" encoding="utf-8"?>
+<p:notes xmlns:a="http://schemas.openxmlformats.org/drawingml/2006/main" xmlns:r="http://schemas.openxmlformats.org/officeDocument/2006/relationships" xmlns:p="http://schemas.openxmlformats.org/presentationml/2006/main" showMasterSp="0" showMasterPhAnim="0">
+  <p:cSld>
+    <p:spTree>
+      <p:nvGrpSpPr>
         <p:cNvPr id="1" name="Shape 154"/>
         <p:cNvGrpSpPr/>
         <p:nvPr/>
@@ -1199,110 +1303,6 @@
       <p:sp>
         <p:nvSpPr>
           <p:cNvPr id="156" name="Google Shape;156;g286ee612a7b_2_0:notes"/>
-          <p:cNvSpPr txBox="1">
-            <a:spLocks noGrp="1"/>
-          </p:cNvSpPr>
-          <p:nvPr>
-            <p:ph type="body" idx="1"/>
-          </p:nvPr>
-        </p:nvSpPr>
-        <p:spPr>
-          <a:xfrm>
-            <a:off x="685800" y="4343400"/>
-            <a:ext cx="5486400" cy="4114800"/>
-          </a:xfrm>
-          <a:prstGeom prst="rect">
-            <a:avLst/>
-          </a:prstGeom>
-        </p:spPr>
-        <p:txBody>
-          <a:bodyPr spcFirstLastPara="1" wrap="square" lIns="91425" tIns="91425" rIns="91425" bIns="91425" anchor="t" anchorCtr="0">
-            <a:noAutofit/>
-          </a:bodyPr>
-          <a:lstStyle/>
-          <a:p>
-            <a:pPr marL="0" lvl="0" indent="0" algn="l" rtl="0">
-              <a:spcBef>
-                <a:spcPts val="0"/>
-              </a:spcBef>
-              <a:spcAft>
-                <a:spcPts val="0"/>
-              </a:spcAft>
-              <a:buNone/>
-            </a:pPr>
-            <a:endParaRPr/>
-          </a:p>
-        </p:txBody>
-      </p:sp>
-    </p:spTree>
-  </p:cSld>
-  <p:clrMapOvr>
-    <a:masterClrMapping/>
-  </p:clrMapOvr>
-</p:notes>
-</file>
-
-<file path=ppt/notesSlides/notesSlide6.xml><?xml version="1.0" encoding="utf-8"?>
-<p:notes xmlns:a="http://schemas.openxmlformats.org/drawingml/2006/main" xmlns:r="http://schemas.openxmlformats.org/officeDocument/2006/relationships" xmlns:p="http://schemas.openxmlformats.org/presentationml/2006/main" showMasterSp="0" showMasterPhAnim="0">
-  <p:cSld>
-    <p:spTree>
-      <p:nvGrpSpPr>
-        <p:cNvPr id="1" name="Shape 159"/>
-        <p:cNvGrpSpPr/>
-        <p:nvPr/>
-      </p:nvGrpSpPr>
-      <p:grpSpPr>
-        <a:xfrm>
-          <a:off x="0" y="0"/>
-          <a:ext cx="0" cy="0"/>
-          <a:chOff x="0" y="0"/>
-          <a:chExt cx="0" cy="0"/>
-        </a:xfrm>
-      </p:grpSpPr>
-      <p:sp>
-        <p:nvSpPr>
-          <p:cNvPr id="160" name="Google Shape;160;g286ee612a7b_2_5:notes"/>
-          <p:cNvSpPr>
-            <a:spLocks noGrp="1" noRot="1" noChangeAspect="1"/>
-          </p:cNvSpPr>
-          <p:nvPr>
-            <p:ph type="sldImg" idx="2"/>
-          </p:nvPr>
-        </p:nvSpPr>
-        <p:spPr>
-          <a:xfrm>
-            <a:off x="381300" y="685800"/>
-            <a:ext cx="6096000" cy="3429000"/>
-          </a:xfrm>
-          <a:custGeom>
-            <a:avLst/>
-            <a:gdLst/>
-            <a:ahLst/>
-            <a:cxnLst/>
-            <a:rect l="l" t="t" r="r" b="b"/>
-            <a:pathLst>
-              <a:path w="120000" h="120000" extrusionOk="0">
-                <a:moveTo>
-                  <a:pt x="0" y="0"/>
-                </a:moveTo>
-                <a:lnTo>
-                  <a:pt x="120000" y="0"/>
-                </a:lnTo>
-                <a:lnTo>
-                  <a:pt x="120000" y="120000"/>
-                </a:lnTo>
-                <a:lnTo>
-                  <a:pt x="0" y="120000"/>
-                </a:lnTo>
-                <a:close/>
-              </a:path>
-            </a:pathLst>
-          </a:custGeom>
-        </p:spPr>
-      </p:sp>
-      <p:sp>
-        <p:nvSpPr>
-          <p:cNvPr id="161" name="Google Shape;161;g286ee612a7b_2_5:notes"/>
           <p:cNvSpPr txBox="1">
             <a:spLocks noGrp="1"/>
           </p:cNvSpPr>
@@ -10082,6 +10082,59 @@
   <p:cSld>
     <p:spTree>
       <p:nvGrpSpPr>
+        <p:cNvPr id="1" name="Shape 162"/>
+        <p:cNvGrpSpPr/>
+        <p:nvPr/>
+      </p:nvGrpSpPr>
+      <p:grpSpPr>
+        <a:xfrm>
+          <a:off x="0" y="0"/>
+          <a:ext cx="0" cy="0"/>
+          <a:chOff x="0" y="0"/>
+          <a:chExt cx="0" cy="0"/>
+        </a:xfrm>
+      </p:grpSpPr>
+      <p:pic>
+        <p:nvPicPr>
+          <p:cNvPr id="163" name="Google Shape;163;p18"/>
+          <p:cNvPicPr preferRelativeResize="0"/>
+          <p:nvPr/>
+        </p:nvPicPr>
+        <p:blipFill>
+          <a:blip r:embed="rId3">
+            <a:alphaModFix/>
+          </a:blip>
+          <a:stretch>
+            <a:fillRect/>
+          </a:stretch>
+        </p:blipFill>
+        <p:spPr>
+          <a:xfrm>
+            <a:off x="1804311" y="267750"/>
+            <a:ext cx="5535374" cy="4608000"/>
+          </a:xfrm>
+          <a:prstGeom prst="rect">
+            <a:avLst/>
+          </a:prstGeom>
+          <a:noFill/>
+          <a:ln>
+            <a:noFill/>
+          </a:ln>
+        </p:spPr>
+      </p:pic>
+    </p:spTree>
+  </p:cSld>
+  <p:clrMapOvr>
+    <a:masterClrMapping/>
+  </p:clrMapOvr>
+</p:sld>
+</file>
+
+<file path=ppt/slides/slide6.xml><?xml version="1.0" encoding="utf-8"?>
+<p:sld xmlns:a="http://schemas.openxmlformats.org/drawingml/2006/main" xmlns:r="http://schemas.openxmlformats.org/officeDocument/2006/relationships" xmlns:p="http://schemas.openxmlformats.org/presentationml/2006/main">
+  <p:cSld>
+    <p:spTree>
+      <p:nvGrpSpPr>
         <p:cNvPr id="1" name="Shape 157"/>
         <p:cNvGrpSpPr/>
         <p:nvPr/>
@@ -10112,59 +10165,6 @@
           <a:xfrm>
             <a:off x="1135763" y="478012"/>
             <a:ext cx="6872474" cy="4187475"/>
-          </a:xfrm>
-          <a:prstGeom prst="rect">
-            <a:avLst/>
-          </a:prstGeom>
-          <a:noFill/>
-          <a:ln>
-            <a:noFill/>
-          </a:ln>
-        </p:spPr>
-      </p:pic>
-    </p:spTree>
-  </p:cSld>
-  <p:clrMapOvr>
-    <a:masterClrMapping/>
-  </p:clrMapOvr>
-</p:sld>
-</file>
-
-<file path=ppt/slides/slide6.xml><?xml version="1.0" encoding="utf-8"?>
-<p:sld xmlns:a="http://schemas.openxmlformats.org/drawingml/2006/main" xmlns:r="http://schemas.openxmlformats.org/officeDocument/2006/relationships" xmlns:p="http://schemas.openxmlformats.org/presentationml/2006/main">
-  <p:cSld>
-    <p:spTree>
-      <p:nvGrpSpPr>
-        <p:cNvPr id="1" name="Shape 162"/>
-        <p:cNvGrpSpPr/>
-        <p:nvPr/>
-      </p:nvGrpSpPr>
-      <p:grpSpPr>
-        <a:xfrm>
-          <a:off x="0" y="0"/>
-          <a:ext cx="0" cy="0"/>
-          <a:chOff x="0" y="0"/>
-          <a:chExt cx="0" cy="0"/>
-        </a:xfrm>
-      </p:grpSpPr>
-      <p:pic>
-        <p:nvPicPr>
-          <p:cNvPr id="163" name="Google Shape;163;p18"/>
-          <p:cNvPicPr preferRelativeResize="0"/>
-          <p:nvPr/>
-        </p:nvPicPr>
-        <p:blipFill>
-          <a:blip r:embed="rId3">
-            <a:alphaModFix/>
-          </a:blip>
-          <a:stretch>
-            <a:fillRect/>
-          </a:stretch>
-        </p:blipFill>
-        <p:spPr>
-          <a:xfrm>
-            <a:off x="1804311" y="267750"/>
-            <a:ext cx="5535374" cy="4608000"/>
           </a:xfrm>
           <a:prstGeom prst="rect">
             <a:avLst/>

</xml_diff>